<commit_message>
Keeping just the relevant files
</commit_message>
<xml_diff>
--- a/Exp1/instructions/Instructions UNM02.pptx
+++ b/Exp1/instructions/Instructions UNM02.pptx
@@ -5,7 +5,7 @@
     <p:sldMasterId id="2147483672" r:id="rId1"/>
   </p:sldMasterIdLst>
   <p:notesMasterIdLst>
-    <p:notesMasterId r:id="rId19"/>
+    <p:notesMasterId r:id="rId16"/>
   </p:notesMasterIdLst>
   <p:sldIdLst>
     <p:sldId id="306" r:id="rId2"/>
@@ -19,12 +19,9 @@
     <p:sldId id="305" r:id="rId10"/>
     <p:sldId id="316" r:id="rId11"/>
     <p:sldId id="320" r:id="rId12"/>
-    <p:sldId id="313" r:id="rId13"/>
-    <p:sldId id="317" r:id="rId14"/>
-    <p:sldId id="321" r:id="rId15"/>
-    <p:sldId id="296" r:id="rId16"/>
-    <p:sldId id="310" r:id="rId17"/>
-    <p:sldId id="311" r:id="rId18"/>
+    <p:sldId id="296" r:id="rId13"/>
+    <p:sldId id="310" r:id="rId14"/>
+    <p:sldId id="311" r:id="rId15"/>
   </p:sldIdLst>
   <p:sldSz cx="34559875" cy="19440525"/>
   <p:notesSz cx="6858000" cy="9144000"/>
@@ -143,9 +140,6 @@
             <p14:sldId id="305"/>
             <p14:sldId id="316"/>
             <p14:sldId id="320"/>
-            <p14:sldId id="313"/>
-            <p14:sldId id="317"/>
-            <p14:sldId id="321"/>
           </p14:sldIdLst>
         </p14:section>
         <p14:section name="Debrief" id="{4FAAF6A1-0334-4E27-BFD0-4996D0C6AB0B}">
@@ -175,16 +169,106 @@
 </p:presentation>
 </file>
 
-<file path=ppt/revisionInfo.xml><?xml version="1.0" encoding="utf-8"?>
-<p1510:revInfo xmlns:a="http://schemas.openxmlformats.org/drawingml/2006/main" xmlns:r="http://schemas.openxmlformats.org/officeDocument/2006/relationships" xmlns:p1510="http://schemas.microsoft.com/office/powerpoint/2015/10/main">
-  <p1510:revLst>
-    <p1510:client id="{A29582EF-BFFF-484A-A71E-673947BB4534}" v="3" dt="2023-07-27T12:55:21.110"/>
-  </p1510:revLst>
-</p1510:revInfo>
-</file>
-
 <file path=ppt/changesInfos/changesInfo1.xml><?xml version="1.0" encoding="utf-8"?>
 <pc:chgInfo xmlns:a="http://schemas.openxmlformats.org/drawingml/2006/main" xmlns:r="http://schemas.openxmlformats.org/officeDocument/2006/relationships" xmlns:ac="http://schemas.microsoft.com/office/drawing/2013/main/command" xmlns:pc="http://schemas.microsoft.com/office/powerpoint/2013/main/command">
+  <pc:docChgLst>
+    <pc:chgData name="Muniz-Diez, Clara" userId="1a81c6c9-8ef1-45fa-9045-8f70227f4ed9" providerId="ADAL" clId="{070AF3DB-E232-4857-A383-CD58F91F231D}"/>
+    <pc:docChg chg="undo custSel delSld modSld modSection">
+      <pc:chgData name="Muniz-Diez, Clara" userId="1a81c6c9-8ef1-45fa-9045-8f70227f4ed9" providerId="ADAL" clId="{070AF3DB-E232-4857-A383-CD58F91F231D}" dt="2023-09-12T13:10:55.902" v="233" actId="21"/>
+      <pc:docMkLst>
+        <pc:docMk/>
+      </pc:docMkLst>
+      <pc:sldChg chg="addSp delSp modSp mod">
+        <pc:chgData name="Muniz-Diez, Clara" userId="1a81c6c9-8ef1-45fa-9045-8f70227f4ed9" providerId="ADAL" clId="{070AF3DB-E232-4857-A383-CD58F91F231D}" dt="2023-09-12T13:03:01.595" v="223" actId="207"/>
+        <pc:sldMkLst>
+          <pc:docMk/>
+          <pc:sldMk cId="2669918933" sldId="305"/>
+        </pc:sldMkLst>
+        <pc:spChg chg="add del mod">
+          <ac:chgData name="Muniz-Diez, Clara" userId="1a81c6c9-8ef1-45fa-9045-8f70227f4ed9" providerId="ADAL" clId="{070AF3DB-E232-4857-A383-CD58F91F231D}" dt="2023-09-12T13:03:01.595" v="223" actId="207"/>
+          <ac:spMkLst>
+            <pc:docMk/>
+            <pc:sldMk cId="2669918933" sldId="305"/>
+            <ac:spMk id="2" creationId="{9625C3A8-B141-A931-216B-F8D3C9CFDE2E}"/>
+          </ac:spMkLst>
+        </pc:spChg>
+      </pc:sldChg>
+      <pc:sldChg chg="addSp delSp modSp mod">
+        <pc:chgData name="Muniz-Diez, Clara" userId="1a81c6c9-8ef1-45fa-9045-8f70227f4ed9" providerId="ADAL" clId="{070AF3DB-E232-4857-A383-CD58F91F231D}" dt="2023-09-12T13:10:55.902" v="233" actId="21"/>
+        <pc:sldMkLst>
+          <pc:docMk/>
+          <pc:sldMk cId="166677748" sldId="306"/>
+        </pc:sldMkLst>
+        <pc:spChg chg="mod">
+          <ac:chgData name="Muniz-Diez, Clara" userId="1a81c6c9-8ef1-45fa-9045-8f70227f4ed9" providerId="ADAL" clId="{070AF3DB-E232-4857-A383-CD58F91F231D}" dt="2023-09-12T13:10:05.804" v="231" actId="20577"/>
+          <ac:spMkLst>
+            <pc:docMk/>
+            <pc:sldMk cId="166677748" sldId="306"/>
+            <ac:spMk id="2" creationId="{FAB005FC-425F-5F94-296B-EAFB873477C2}"/>
+          </ac:spMkLst>
+        </pc:spChg>
+        <pc:spChg chg="add del mod">
+          <ac:chgData name="Muniz-Diez, Clara" userId="1a81c6c9-8ef1-45fa-9045-8f70227f4ed9" providerId="ADAL" clId="{070AF3DB-E232-4857-A383-CD58F91F231D}" dt="2023-09-12T13:10:55.902" v="233" actId="21"/>
+          <ac:spMkLst>
+            <pc:docMk/>
+            <pc:sldMk cId="166677748" sldId="306"/>
+            <ac:spMk id="3" creationId="{92B21709-9305-6A6E-4C8F-0911C9FFB155}"/>
+          </ac:spMkLst>
+        </pc:spChg>
+      </pc:sldChg>
+      <pc:sldChg chg="del">
+        <pc:chgData name="Muniz-Diez, Clara" userId="1a81c6c9-8ef1-45fa-9045-8f70227f4ed9" providerId="ADAL" clId="{070AF3DB-E232-4857-A383-CD58F91F231D}" dt="2023-09-12T13:00:55.598" v="218" actId="47"/>
+        <pc:sldMkLst>
+          <pc:docMk/>
+          <pc:sldMk cId="3726311273" sldId="313"/>
+        </pc:sldMkLst>
+      </pc:sldChg>
+      <pc:sldChg chg="modSp mod">
+        <pc:chgData name="Muniz-Diez, Clara" userId="1a81c6c9-8ef1-45fa-9045-8f70227f4ed9" providerId="ADAL" clId="{070AF3DB-E232-4857-A383-CD58F91F231D}" dt="2023-09-12T12:59:09.755" v="159" actId="20577"/>
+        <pc:sldMkLst>
+          <pc:docMk/>
+          <pc:sldMk cId="3963436172" sldId="316"/>
+        </pc:sldMkLst>
+        <pc:spChg chg="mod">
+          <ac:chgData name="Muniz-Diez, Clara" userId="1a81c6c9-8ef1-45fa-9045-8f70227f4ed9" providerId="ADAL" clId="{070AF3DB-E232-4857-A383-CD58F91F231D}" dt="2023-09-12T12:59:09.755" v="159" actId="20577"/>
+          <ac:spMkLst>
+            <pc:docMk/>
+            <pc:sldMk cId="3963436172" sldId="316"/>
+            <ac:spMk id="2" creationId="{9625C3A8-B141-A931-216B-F8D3C9CFDE2E}"/>
+          </ac:spMkLst>
+        </pc:spChg>
+      </pc:sldChg>
+      <pc:sldChg chg="del">
+        <pc:chgData name="Muniz-Diez, Clara" userId="1a81c6c9-8ef1-45fa-9045-8f70227f4ed9" providerId="ADAL" clId="{070AF3DB-E232-4857-A383-CD58F91F231D}" dt="2023-09-12T13:00:57.586" v="219" actId="47"/>
+        <pc:sldMkLst>
+          <pc:docMk/>
+          <pc:sldMk cId="3971898477" sldId="317"/>
+        </pc:sldMkLst>
+      </pc:sldChg>
+      <pc:sldChg chg="modSp mod">
+        <pc:chgData name="Muniz-Diez, Clara" userId="1a81c6c9-8ef1-45fa-9045-8f70227f4ed9" providerId="ADAL" clId="{070AF3DB-E232-4857-A383-CD58F91F231D}" dt="2023-09-12T13:00:50.020" v="217" actId="20577"/>
+        <pc:sldMkLst>
+          <pc:docMk/>
+          <pc:sldMk cId="2823760325" sldId="320"/>
+        </pc:sldMkLst>
+        <pc:spChg chg="mod">
+          <ac:chgData name="Muniz-Diez, Clara" userId="1a81c6c9-8ef1-45fa-9045-8f70227f4ed9" providerId="ADAL" clId="{070AF3DB-E232-4857-A383-CD58F91F231D}" dt="2023-09-12T13:00:50.020" v="217" actId="20577"/>
+          <ac:spMkLst>
+            <pc:docMk/>
+            <pc:sldMk cId="2823760325" sldId="320"/>
+            <ac:spMk id="2" creationId="{A0FBFD53-51E8-79D1-5BFF-88CE7C895A62}"/>
+          </ac:spMkLst>
+        </pc:spChg>
+      </pc:sldChg>
+      <pc:sldChg chg="del">
+        <pc:chgData name="Muniz-Diez, Clara" userId="1a81c6c9-8ef1-45fa-9045-8f70227f4ed9" providerId="ADAL" clId="{070AF3DB-E232-4857-A383-CD58F91F231D}" dt="2023-09-12T13:00:59.827" v="220" actId="47"/>
+        <pc:sldMkLst>
+          <pc:docMk/>
+          <pc:sldMk cId="2183151105" sldId="321"/>
+        </pc:sldMkLst>
+      </pc:sldChg>
+    </pc:docChg>
+  </pc:docChgLst>
   <pc:docChgLst>
     <pc:chgData name="Clara Muniz-Diez" userId="1a81c6c9-8ef1-45fa-9045-8f70227f4ed9" providerId="ADAL" clId="{12D39073-3FC0-4DF4-8784-2F0ACCA963E4}"/>
     <pc:docChg chg="undo custSel addSld modSld modSection">
@@ -733,6 +817,30 @@
             <pc:docMk/>
             <pc:sldMk cId="311487248" sldId="309"/>
             <ac:spMk id="5" creationId="{00000000-0000-0000-0000-000000000000}"/>
+          </ac:spMkLst>
+        </pc:spChg>
+      </pc:sldChg>
+    </pc:docChg>
+  </pc:docChgLst>
+  <pc:docChgLst>
+    <pc:chgData name="Muniz-Diez, Clara" userId="1a81c6c9-8ef1-45fa-9045-8f70227f4ed9" providerId="ADAL" clId="{0DA2A45E-B43C-44E9-838F-6C7F87E0D060}"/>
+    <pc:docChg chg="modSld">
+      <pc:chgData name="Muniz-Diez, Clara" userId="1a81c6c9-8ef1-45fa-9045-8f70227f4ed9" providerId="ADAL" clId="{0DA2A45E-B43C-44E9-838F-6C7F87E0D060}" dt="2023-09-25T10:23:37.770" v="4" actId="20577"/>
+      <pc:docMkLst>
+        <pc:docMk/>
+      </pc:docMkLst>
+      <pc:sldChg chg="modSp mod">
+        <pc:chgData name="Muniz-Diez, Clara" userId="1a81c6c9-8ef1-45fa-9045-8f70227f4ed9" providerId="ADAL" clId="{0DA2A45E-B43C-44E9-838F-6C7F87E0D060}" dt="2023-09-25T10:23:37.770" v="4" actId="20577"/>
+        <pc:sldMkLst>
+          <pc:docMk/>
+          <pc:sldMk cId="166677748" sldId="306"/>
+        </pc:sldMkLst>
+        <pc:spChg chg="mod">
+          <ac:chgData name="Muniz-Diez, Clara" userId="1a81c6c9-8ef1-45fa-9045-8f70227f4ed9" providerId="ADAL" clId="{0DA2A45E-B43C-44E9-838F-6C7F87E0D060}" dt="2023-09-25T10:23:37.770" v="4" actId="20577"/>
+          <ac:spMkLst>
+            <pc:docMk/>
+            <pc:sldMk cId="166677748" sldId="306"/>
+            <ac:spMk id="2" creationId="{FAB005FC-425F-5F94-296B-EAFB873477C2}"/>
           </ac:spMkLst>
         </pc:spChg>
       </pc:sldChg>
@@ -1431,7 +1539,7 @@
           <a:p>
             <a:fld id="{252F094F-DCC0-9241-BDBF-9F4129FBD7AB}" type="datetimeFigureOut">
               <a:rPr lang="en-US" smtClean="0"/>
-              <a:t>7/28/2023</a:t>
+              <a:t>9/25/2023</a:t>
             </a:fld>
             <a:endParaRPr lang="en-US"/>
           </a:p>
@@ -1955,7 +2063,7 @@
     </p:spTree>
     <p:extLst>
       <p:ext uri="{BB962C8B-B14F-4D97-AF65-F5344CB8AC3E}">
-        <p14:creationId xmlns:p14="http://schemas.microsoft.com/office/powerpoint/2010/main" val="585786489"/>
+        <p14:creationId xmlns:p14="http://schemas.microsoft.com/office/powerpoint/2010/main" val="1458860247"/>
       </p:ext>
     </p:extLst>
   </p:cSld>
@@ -2044,7 +2152,7 @@
     </p:spTree>
     <p:extLst>
       <p:ext uri="{BB962C8B-B14F-4D97-AF65-F5344CB8AC3E}">
-        <p14:creationId xmlns:p14="http://schemas.microsoft.com/office/powerpoint/2010/main" val="523299003"/>
+        <p14:creationId xmlns:p14="http://schemas.microsoft.com/office/powerpoint/2010/main" val="3668890613"/>
       </p:ext>
     </p:extLst>
   </p:cSld>
@@ -2125,273 +2233,6 @@
             <a:fld id="{4C7214EF-422B-984C-B19B-86143C52FF63}" type="slidenum">
               <a:rPr lang="en-US" smtClean="0"/>
               <a:t>14</a:t>
-            </a:fld>
-            <a:endParaRPr lang="en-US"/>
-          </a:p>
-        </p:txBody>
-      </p:sp>
-    </p:spTree>
-    <p:extLst>
-      <p:ext uri="{BB962C8B-B14F-4D97-AF65-F5344CB8AC3E}">
-        <p14:creationId xmlns:p14="http://schemas.microsoft.com/office/powerpoint/2010/main" val="2486251018"/>
-      </p:ext>
-    </p:extLst>
-  </p:cSld>
-  <p:clrMapOvr>
-    <a:masterClrMapping/>
-  </p:clrMapOvr>
-</p:notes>
-</file>
-
-<file path=ppt/notesSlides/notesSlide14.xml><?xml version="1.0" encoding="utf-8"?>
-<p:notes xmlns:a="http://schemas.openxmlformats.org/drawingml/2006/main" xmlns:r="http://schemas.openxmlformats.org/officeDocument/2006/relationships" xmlns:p="http://schemas.openxmlformats.org/presentationml/2006/main">
-  <p:cSld>
-    <p:spTree>
-      <p:nvGrpSpPr>
-        <p:cNvPr id="1" name=""/>
-        <p:cNvGrpSpPr/>
-        <p:nvPr/>
-      </p:nvGrpSpPr>
-      <p:grpSpPr>
-        <a:xfrm>
-          <a:off x="0" y="0"/>
-          <a:ext cx="0" cy="0"/>
-          <a:chOff x="0" y="0"/>
-          <a:chExt cx="0" cy="0"/>
-        </a:xfrm>
-      </p:grpSpPr>
-      <p:sp>
-        <p:nvSpPr>
-          <p:cNvPr id="2" name="Slide Image Placeholder 1"/>
-          <p:cNvSpPr>
-            <a:spLocks noGrp="1" noRot="1" noChangeAspect="1"/>
-          </p:cNvSpPr>
-          <p:nvPr>
-            <p:ph type="sldImg"/>
-          </p:nvPr>
-        </p:nvSpPr>
-        <p:spPr>
-          <a:xfrm>
-            <a:off x="685800" y="1143000"/>
-            <a:ext cx="5486400" cy="3086100"/>
-          </a:xfrm>
-        </p:spPr>
-      </p:sp>
-      <p:sp>
-        <p:nvSpPr>
-          <p:cNvPr id="3" name="Notes Placeholder 2"/>
-          <p:cNvSpPr>
-            <a:spLocks noGrp="1"/>
-          </p:cNvSpPr>
-          <p:nvPr>
-            <p:ph type="body" idx="1"/>
-          </p:nvPr>
-        </p:nvSpPr>
-        <p:spPr/>
-        <p:txBody>
-          <a:bodyPr/>
-          <a:lstStyle/>
-          <a:p>
-            <a:endParaRPr lang="en-US"/>
-          </a:p>
-        </p:txBody>
-      </p:sp>
-      <p:sp>
-        <p:nvSpPr>
-          <p:cNvPr id="4" name="Slide Number Placeholder 3"/>
-          <p:cNvSpPr>
-            <a:spLocks noGrp="1"/>
-          </p:cNvSpPr>
-          <p:nvPr>
-            <p:ph type="sldNum" sz="quarter" idx="10"/>
-          </p:nvPr>
-        </p:nvSpPr>
-        <p:spPr/>
-        <p:txBody>
-          <a:bodyPr/>
-          <a:lstStyle/>
-          <a:p>
-            <a:fld id="{4C7214EF-422B-984C-B19B-86143C52FF63}" type="slidenum">
-              <a:rPr lang="en-US" smtClean="0"/>
-              <a:t>15</a:t>
-            </a:fld>
-            <a:endParaRPr lang="en-US"/>
-          </a:p>
-        </p:txBody>
-      </p:sp>
-    </p:spTree>
-    <p:extLst>
-      <p:ext uri="{BB962C8B-B14F-4D97-AF65-F5344CB8AC3E}">
-        <p14:creationId xmlns:p14="http://schemas.microsoft.com/office/powerpoint/2010/main" val="1458860247"/>
-      </p:ext>
-    </p:extLst>
-  </p:cSld>
-  <p:clrMapOvr>
-    <a:masterClrMapping/>
-  </p:clrMapOvr>
-</p:notes>
-</file>
-
-<file path=ppt/notesSlides/notesSlide15.xml><?xml version="1.0" encoding="utf-8"?>
-<p:notes xmlns:a="http://schemas.openxmlformats.org/drawingml/2006/main" xmlns:r="http://schemas.openxmlformats.org/officeDocument/2006/relationships" xmlns:p="http://schemas.openxmlformats.org/presentationml/2006/main">
-  <p:cSld>
-    <p:spTree>
-      <p:nvGrpSpPr>
-        <p:cNvPr id="1" name=""/>
-        <p:cNvGrpSpPr/>
-        <p:nvPr/>
-      </p:nvGrpSpPr>
-      <p:grpSpPr>
-        <a:xfrm>
-          <a:off x="0" y="0"/>
-          <a:ext cx="0" cy="0"/>
-          <a:chOff x="0" y="0"/>
-          <a:chExt cx="0" cy="0"/>
-        </a:xfrm>
-      </p:grpSpPr>
-      <p:sp>
-        <p:nvSpPr>
-          <p:cNvPr id="2" name="Slide Image Placeholder 1"/>
-          <p:cNvSpPr>
-            <a:spLocks noGrp="1" noRot="1" noChangeAspect="1"/>
-          </p:cNvSpPr>
-          <p:nvPr>
-            <p:ph type="sldImg"/>
-          </p:nvPr>
-        </p:nvSpPr>
-        <p:spPr>
-          <a:xfrm>
-            <a:off x="685800" y="1143000"/>
-            <a:ext cx="5486400" cy="3086100"/>
-          </a:xfrm>
-        </p:spPr>
-      </p:sp>
-      <p:sp>
-        <p:nvSpPr>
-          <p:cNvPr id="3" name="Notes Placeholder 2"/>
-          <p:cNvSpPr>
-            <a:spLocks noGrp="1"/>
-          </p:cNvSpPr>
-          <p:nvPr>
-            <p:ph type="body" idx="1"/>
-          </p:nvPr>
-        </p:nvSpPr>
-        <p:spPr/>
-        <p:txBody>
-          <a:bodyPr/>
-          <a:lstStyle/>
-          <a:p>
-            <a:endParaRPr lang="en-US"/>
-          </a:p>
-        </p:txBody>
-      </p:sp>
-      <p:sp>
-        <p:nvSpPr>
-          <p:cNvPr id="4" name="Slide Number Placeholder 3"/>
-          <p:cNvSpPr>
-            <a:spLocks noGrp="1"/>
-          </p:cNvSpPr>
-          <p:nvPr>
-            <p:ph type="sldNum" sz="quarter" idx="10"/>
-          </p:nvPr>
-        </p:nvSpPr>
-        <p:spPr/>
-        <p:txBody>
-          <a:bodyPr/>
-          <a:lstStyle/>
-          <a:p>
-            <a:fld id="{4C7214EF-422B-984C-B19B-86143C52FF63}" type="slidenum">
-              <a:rPr lang="en-US" smtClean="0"/>
-              <a:t>16</a:t>
-            </a:fld>
-            <a:endParaRPr lang="en-US"/>
-          </a:p>
-        </p:txBody>
-      </p:sp>
-    </p:spTree>
-    <p:extLst>
-      <p:ext uri="{BB962C8B-B14F-4D97-AF65-F5344CB8AC3E}">
-        <p14:creationId xmlns:p14="http://schemas.microsoft.com/office/powerpoint/2010/main" val="3668890613"/>
-      </p:ext>
-    </p:extLst>
-  </p:cSld>
-  <p:clrMapOvr>
-    <a:masterClrMapping/>
-  </p:clrMapOvr>
-</p:notes>
-</file>
-
-<file path=ppt/notesSlides/notesSlide16.xml><?xml version="1.0" encoding="utf-8"?>
-<p:notes xmlns:a="http://schemas.openxmlformats.org/drawingml/2006/main" xmlns:r="http://schemas.openxmlformats.org/officeDocument/2006/relationships" xmlns:p="http://schemas.openxmlformats.org/presentationml/2006/main">
-  <p:cSld>
-    <p:spTree>
-      <p:nvGrpSpPr>
-        <p:cNvPr id="1" name=""/>
-        <p:cNvGrpSpPr/>
-        <p:nvPr/>
-      </p:nvGrpSpPr>
-      <p:grpSpPr>
-        <a:xfrm>
-          <a:off x="0" y="0"/>
-          <a:ext cx="0" cy="0"/>
-          <a:chOff x="0" y="0"/>
-          <a:chExt cx="0" cy="0"/>
-        </a:xfrm>
-      </p:grpSpPr>
-      <p:sp>
-        <p:nvSpPr>
-          <p:cNvPr id="2" name="Slide Image Placeholder 1"/>
-          <p:cNvSpPr>
-            <a:spLocks noGrp="1" noRot="1" noChangeAspect="1"/>
-          </p:cNvSpPr>
-          <p:nvPr>
-            <p:ph type="sldImg"/>
-          </p:nvPr>
-        </p:nvSpPr>
-        <p:spPr>
-          <a:xfrm>
-            <a:off x="685800" y="1143000"/>
-            <a:ext cx="5486400" cy="3086100"/>
-          </a:xfrm>
-        </p:spPr>
-      </p:sp>
-      <p:sp>
-        <p:nvSpPr>
-          <p:cNvPr id="3" name="Notes Placeholder 2"/>
-          <p:cNvSpPr>
-            <a:spLocks noGrp="1"/>
-          </p:cNvSpPr>
-          <p:nvPr>
-            <p:ph type="body" idx="1"/>
-          </p:nvPr>
-        </p:nvSpPr>
-        <p:spPr/>
-        <p:txBody>
-          <a:bodyPr/>
-          <a:lstStyle/>
-          <a:p>
-            <a:endParaRPr lang="en-US"/>
-          </a:p>
-        </p:txBody>
-      </p:sp>
-      <p:sp>
-        <p:nvSpPr>
-          <p:cNvPr id="4" name="Slide Number Placeholder 3"/>
-          <p:cNvSpPr>
-            <a:spLocks noGrp="1"/>
-          </p:cNvSpPr>
-          <p:nvPr>
-            <p:ph type="sldNum" sz="quarter" idx="10"/>
-          </p:nvPr>
-        </p:nvSpPr>
-        <p:spPr/>
-        <p:txBody>
-          <a:bodyPr/>
-          <a:lstStyle/>
-          <a:p>
-            <a:fld id="{4C7214EF-422B-984C-B19B-86143C52FF63}" type="slidenum">
-              <a:rPr lang="en-US" smtClean="0"/>
-              <a:t>17</a:t>
             </a:fld>
             <a:endParaRPr lang="en-US"/>
           </a:p>
@@ -3246,7 +3087,7 @@
           <a:p>
             <a:fld id="{0002DDC5-7EBB-47AC-BFF5-8E257E6BF8C7}" type="datetimeFigureOut">
               <a:rPr lang="en-AU" smtClean="0"/>
-              <a:t>28/07/2023</a:t>
+              <a:t>25/09/2023</a:t>
             </a:fld>
             <a:endParaRPr lang="en-AU"/>
           </a:p>
@@ -3414,7 +3255,7 @@
           <a:p>
             <a:fld id="{0002DDC5-7EBB-47AC-BFF5-8E257E6BF8C7}" type="datetimeFigureOut">
               <a:rPr lang="en-AU" smtClean="0"/>
-              <a:t>28/07/2023</a:t>
+              <a:t>25/09/2023</a:t>
             </a:fld>
             <a:endParaRPr lang="en-AU"/>
           </a:p>
@@ -3592,7 +3433,7 @@
           <a:p>
             <a:fld id="{0002DDC5-7EBB-47AC-BFF5-8E257E6BF8C7}" type="datetimeFigureOut">
               <a:rPr lang="en-AU" smtClean="0"/>
-              <a:t>28/07/2023</a:t>
+              <a:t>25/09/2023</a:t>
             </a:fld>
             <a:endParaRPr lang="en-AU"/>
           </a:p>
@@ -3760,7 +3601,7 @@
           <a:p>
             <a:fld id="{0002DDC5-7EBB-47AC-BFF5-8E257E6BF8C7}" type="datetimeFigureOut">
               <a:rPr lang="en-AU" smtClean="0"/>
-              <a:t>28/07/2023</a:t>
+              <a:t>25/09/2023</a:t>
             </a:fld>
             <a:endParaRPr lang="en-AU"/>
           </a:p>
@@ -4005,7 +3846,7 @@
           <a:p>
             <a:fld id="{0002DDC5-7EBB-47AC-BFF5-8E257E6BF8C7}" type="datetimeFigureOut">
               <a:rPr lang="en-AU" smtClean="0"/>
-              <a:t>28/07/2023</a:t>
+              <a:t>25/09/2023</a:t>
             </a:fld>
             <a:endParaRPr lang="en-AU"/>
           </a:p>
@@ -4234,7 +4075,7 @@
           <a:p>
             <a:fld id="{0002DDC5-7EBB-47AC-BFF5-8E257E6BF8C7}" type="datetimeFigureOut">
               <a:rPr lang="en-AU" smtClean="0"/>
-              <a:t>28/07/2023</a:t>
+              <a:t>25/09/2023</a:t>
             </a:fld>
             <a:endParaRPr lang="en-AU"/>
           </a:p>
@@ -4598,7 +4439,7 @@
           <a:p>
             <a:fld id="{0002DDC5-7EBB-47AC-BFF5-8E257E6BF8C7}" type="datetimeFigureOut">
               <a:rPr lang="en-AU" smtClean="0"/>
-              <a:t>28/07/2023</a:t>
+              <a:t>25/09/2023</a:t>
             </a:fld>
             <a:endParaRPr lang="en-AU"/>
           </a:p>
@@ -4715,7 +4556,7 @@
           <a:p>
             <a:fld id="{0002DDC5-7EBB-47AC-BFF5-8E257E6BF8C7}" type="datetimeFigureOut">
               <a:rPr lang="en-AU" smtClean="0"/>
-              <a:t>28/07/2023</a:t>
+              <a:t>25/09/2023</a:t>
             </a:fld>
             <a:endParaRPr lang="en-AU"/>
           </a:p>
@@ -4810,7 +4651,7 @@
           <a:p>
             <a:fld id="{0002DDC5-7EBB-47AC-BFF5-8E257E6BF8C7}" type="datetimeFigureOut">
               <a:rPr lang="en-AU" smtClean="0"/>
-              <a:t>28/07/2023</a:t>
+              <a:t>25/09/2023</a:t>
             </a:fld>
             <a:endParaRPr lang="en-AU"/>
           </a:p>
@@ -5085,7 +4926,7 @@
           <a:p>
             <a:fld id="{0002DDC5-7EBB-47AC-BFF5-8E257E6BF8C7}" type="datetimeFigureOut">
               <a:rPr lang="en-AU" smtClean="0"/>
-              <a:t>28/07/2023</a:t>
+              <a:t>25/09/2023</a:t>
             </a:fld>
             <a:endParaRPr lang="en-AU"/>
           </a:p>
@@ -5340,7 +5181,7 @@
           <a:p>
             <a:fld id="{0002DDC5-7EBB-47AC-BFF5-8E257E6BF8C7}" type="datetimeFigureOut">
               <a:rPr lang="en-AU" smtClean="0"/>
-              <a:t>28/07/2023</a:t>
+              <a:t>25/09/2023</a:t>
             </a:fld>
             <a:endParaRPr lang="en-AU"/>
           </a:p>
@@ -5551,7 +5392,7 @@
           <a:p>
             <a:fld id="{0002DDC5-7EBB-47AC-BFF5-8E257E6BF8C7}" type="datetimeFigureOut">
               <a:rPr lang="en-AU" smtClean="0"/>
-              <a:t>28/07/2023</a:t>
+              <a:t>25/09/2023</a:t>
             </a:fld>
             <a:endParaRPr lang="en-AU"/>
           </a:p>
@@ -6083,7 +5924,7 @@
                   <a:schemeClr val="bg1"/>
                 </a:solidFill>
               </a:rPr>
-              <a:t>The experiment will last approximately 20 minutes for which you will be compensated with £2.7. This study uses a task with visual cue stimuli that will be presented on the screen. You will be asked to make a series of responses on each of the trials and performance feedback will be provided after each trial.  </a:t>
+              <a:t>The experiment will last approximately 20 minutes for which you will be compensated with £2.70. This study uses a task with visual cue stimuli that will be presented on the screen. You will be asked to make a series of responses on each of the trials and performance feedback will be provided after each trial.  </a:t>
             </a:r>
           </a:p>
           <a:p>
@@ -6219,7 +6060,7 @@
                   <a:srgbClr val="FFFF00"/>
                 </a:solidFill>
               </a:rPr>
-              <a:t>2 minutes</a:t>
+              <a:t>3 minutes</a:t>
             </a:r>
             <a:r>
               <a:rPr lang="en-US" sz="6200" b="1" dirty="0">
@@ -6377,7 +6218,7 @@
                 </a:solidFill>
                 <a:cs typeface="Calibri"/>
               </a:rPr>
-              <a:t>Two chemicals will appear in the top half of the screen. One of these chemicals has been presented in the task you have just finished, whereas the other is a similar one, but with different </a:t>
+              <a:t>Two chemicals will appear in the top half of the screen. One of these chemicals has been presented in the task you have just finished, whereas the other </a:t>
             </a:r>
             <a:r>
               <a:rPr lang="en-GB" sz="6200" dirty="0">
@@ -6386,7 +6227,7 @@
                 </a:solidFill>
                 <a:cs typeface="Calibri"/>
               </a:rPr>
-              <a:t>colours</a:t>
+              <a:t>was not presented in the previous task.</a:t>
             </a:r>
             <a:r>
               <a:rPr lang="en-US" sz="6200" dirty="0">
@@ -6395,7 +6236,7 @@
                 </a:solidFill>
                 <a:cs typeface="Calibri"/>
               </a:rPr>
-              <a:t>. Your task is to select the chemical you have seen before by clicking on it. Once you make your choice, you will be presented with a scale to rate how certain you are that you made the correct choice (from 1 = completely uncertain to 10 = completely certain). ​</a:t>
+              <a:t> Your mission is to select the chemical you have seen before by clicking on it. Once you make your choice, you will be presented with a scale to rate how certain you are that you made the correct choice (from 1 = completely uncertain to 10 = completely certain). ​</a:t>
             </a:r>
           </a:p>
           <a:p>
@@ -6527,7 +6368,7 @@
                 </a:solidFill>
                 <a:cs typeface="Calibri"/>
               </a:rPr>
-              <a:t>Select the chemical you have seen before</a:t>
+              <a:t>Select the chemical you have seen in the task before</a:t>
             </a:r>
           </a:p>
           <a:p>
@@ -6642,7 +6483,7 @@
           <p:cNvPr id="2" name="Rectangle 1">
             <a:extLst>
               <a:ext uri="{FF2B5EF4-FFF2-40B4-BE49-F238E27FC236}">
-                <a16:creationId xmlns:a16="http://schemas.microsoft.com/office/drawing/2014/main" id="{BCB380B4-3C9F-1D6D-0C36-510ADE8383D7}"/>
+                <a16:creationId xmlns:a16="http://schemas.microsoft.com/office/drawing/2014/main" id="{1D19C4EF-6384-C0FA-0F14-5F33F6CAE244}"/>
               </a:ext>
             </a:extLst>
           </p:cNvPr>
@@ -6657,7 +6498,9 @@
           <a:prstGeom prst="rect">
             <a:avLst/>
           </a:prstGeom>
-          <a:noFill/>
+          <a:solidFill>
+            <a:srgbClr val="7030A0"/>
+          </a:solidFill>
           <a:ln>
             <a:noFill/>
           </a:ln>
@@ -6683,16 +6526,16 @@
           <a:lstStyle/>
           <a:p>
             <a:r>
-              <a:rPr lang="en-US" sz="6200" b="1" dirty="0">
-                <a:solidFill>
-                  <a:srgbClr val="FFFF00"/>
+              <a:rPr lang="en-GB" sz="6200" dirty="0">
+                <a:solidFill>
+                  <a:schemeClr val="bg1"/>
                 </a:solidFill>
               </a:rPr>
-              <a:t>Task 3</a:t>
-            </a:r>
-          </a:p>
-          <a:p>
-            <a:endParaRPr lang="en-US" sz="6200" dirty="0">
+              <a:t>Thank you for your participation in this study. </a:t>
+            </a:r>
+          </a:p>
+          <a:p>
+            <a:endParaRPr lang="en-GB" sz="6200" dirty="0">
               <a:solidFill>
                 <a:schemeClr val="bg1"/>
               </a:solidFill>
@@ -6700,30 +6543,16 @@
           </a:p>
           <a:p>
             <a:r>
-              <a:rPr lang="en-US" sz="6200" dirty="0">
+              <a:rPr lang="en-GB" sz="6200" dirty="0">
                 <a:solidFill>
                   <a:schemeClr val="bg1"/>
                 </a:solidFill>
               </a:rPr>
-              <a:t>This task is very similar to the previous memory test. On each trial, two chemicals will be presented and you have only seen one of them before in the learning part of the experiment (Task 1). </a:t>
-            </a:r>
-            <a:r>
-              <a:rPr lang="en-US" sz="6200" b="1" dirty="0">
-                <a:solidFill>
-                  <a:srgbClr val="92D050"/>
-                </a:solidFill>
-              </a:rPr>
-              <a:t>However, this time the two chemicals will not be similar. Your task is the same, choose the one you have seen in the first part of the experiment (Task 1). </a:t>
-            </a:r>
-            <a:endParaRPr lang="en-US" sz="6200" b="1" dirty="0">
-              <a:solidFill>
-                <a:srgbClr val="92D050"/>
-              </a:solidFill>
-              <a:cs typeface="Calibri"/>
-            </a:endParaRPr>
-          </a:p>
-          <a:p>
-            <a:endParaRPr lang="en-US" sz="6200" dirty="0">
+              <a:t>This study is part of a series of experiments that are designed to investigate attentional processes underlying human learning. Specifically, we aim to explore how the stimuli are processed under different levels of attention.</a:t>
+            </a:r>
+          </a:p>
+          <a:p>
+            <a:endParaRPr lang="en-GB" sz="6200" dirty="0">
               <a:solidFill>
                 <a:schemeClr val="bg1"/>
               </a:solidFill>
@@ -6731,33 +6560,37 @@
           </a:p>
           <a:p>
             <a:r>
-              <a:rPr lang="en-US" sz="6200" dirty="0">
+              <a:rPr lang="en-GB" sz="6200" dirty="0">
                 <a:solidFill>
                   <a:schemeClr val="bg1"/>
                 </a:solidFill>
               </a:rPr>
-              <a:t>As before, your task is to select the chemical you have seen before by clicking on it. Once you make your choice, you will be presented with a scale in which you need to rate how certain you are that you made the correct choice, on a scale from 1 (completely uncertain) to 10 (completely certain). If you are guessing, select 1. </a:t>
-            </a:r>
-            <a:r>
-              <a:rPr lang="en-US" sz="6200" b="1" dirty="0">
-                <a:solidFill>
-                  <a:srgbClr val="92D050"/>
-                </a:solidFill>
-              </a:rPr>
-              <a:t>No feedback will be provided on your choices. </a:t>
-            </a:r>
-            <a:endParaRPr lang="en-US" sz="6200" dirty="0">
+              <a:t>Once a cue is associated with a meaningful outcome (i.e., a response and/or a reward) an attentional bias towards this cue is established. The learnt predictive value of the cue leads to more overt attention being allocated towards it, which increases how much we learn about that cue in the future. </a:t>
+            </a:r>
+          </a:p>
+          <a:p>
+            <a:endParaRPr lang="en-GB" sz="6200" dirty="0">
               <a:solidFill>
-                <a:srgbClr val="92D050"/>
+                <a:schemeClr val="bg1"/>
               </a:solidFill>
             </a:endParaRPr>
+          </a:p>
+          <a:p>
+            <a:r>
+              <a:rPr lang="en-GB" sz="6200" dirty="0">
+                <a:solidFill>
+                  <a:schemeClr val="bg1"/>
+                </a:solidFill>
+              </a:rPr>
+              <a:t>This experiment examines whether higher attention also leads to better recollection of the stimuli.</a:t>
+            </a:r>
           </a:p>
         </p:txBody>
       </p:sp>
     </p:spTree>
     <p:extLst>
       <p:ext uri="{BB962C8B-B14F-4D97-AF65-F5344CB8AC3E}">
-        <p14:creationId xmlns:p14="http://schemas.microsoft.com/office/powerpoint/2010/main" val="3726311273"/>
+        <p14:creationId xmlns:p14="http://schemas.microsoft.com/office/powerpoint/2010/main" val="1439089530"/>
       </p:ext>
     </p:extLst>
   </p:cSld>
@@ -6797,482 +6630,7 @@
           <p:cNvPr id="2" name="Rectangle 1">
             <a:extLst>
               <a:ext uri="{FF2B5EF4-FFF2-40B4-BE49-F238E27FC236}">
-                <a16:creationId xmlns:a16="http://schemas.microsoft.com/office/drawing/2014/main" id="{BCB380B4-3C9F-1D6D-0C36-510ADE8383D7}"/>
-              </a:ext>
-            </a:extLst>
-          </p:cNvPr>
-          <p:cNvSpPr/>
-          <p:nvPr/>
-        </p:nvSpPr>
-        <p:spPr>
-          <a:xfrm>
-            <a:off x="2339937" y="1440262"/>
-            <a:ext cx="29880000" cy="16560000"/>
-          </a:xfrm>
-          <a:prstGeom prst="rect">
-            <a:avLst/>
-          </a:prstGeom>
-          <a:noFill/>
-          <a:ln>
-            <a:noFill/>
-          </a:ln>
-        </p:spPr>
-        <p:style>
-          <a:lnRef idx="2">
-            <a:schemeClr val="accent1">
-              <a:shade val="15000"/>
-            </a:schemeClr>
-          </a:lnRef>
-          <a:fillRef idx="1">
-            <a:schemeClr val="accent1"/>
-          </a:fillRef>
-          <a:effectRef idx="0">
-            <a:schemeClr val="accent1"/>
-          </a:effectRef>
-          <a:fontRef idx="minor">
-            <a:schemeClr val="lt1"/>
-          </a:fontRef>
-        </p:style>
-        <p:txBody>
-          <a:bodyPr rtlCol="0" anchor="t" anchorCtr="0"/>
-          <a:lstStyle/>
-          <a:p>
-            <a:r>
-              <a:rPr lang="en-US" sz="6200" b="1" dirty="0">
-                <a:solidFill>
-                  <a:srgbClr val="FFFF00"/>
-                </a:solidFill>
-              </a:rPr>
-              <a:t>Task 3</a:t>
-            </a:r>
-          </a:p>
-          <a:p>
-            <a:endParaRPr lang="en-US" sz="6200" dirty="0">
-              <a:solidFill>
-                <a:schemeClr val="bg1"/>
-              </a:solidFill>
-            </a:endParaRPr>
-          </a:p>
-          <a:p>
-            <a:r>
-              <a:rPr lang="en-US" sz="6200" dirty="0">
-                <a:solidFill>
-                  <a:schemeClr val="bg1"/>
-                </a:solidFill>
-              </a:rPr>
-              <a:t>This task lasts for about </a:t>
-            </a:r>
-            <a:r>
-              <a:rPr lang="en-US" sz="6200" b="1" dirty="0">
-                <a:solidFill>
-                  <a:srgbClr val="FFFF00"/>
-                </a:solidFill>
-              </a:rPr>
-              <a:t>4 minutes</a:t>
-            </a:r>
-            <a:r>
-              <a:rPr lang="en-US" sz="6200" b="1" dirty="0">
-                <a:solidFill>
-                  <a:schemeClr val="bg1"/>
-                </a:solidFill>
-              </a:rPr>
-              <a:t>. </a:t>
-            </a:r>
-            <a:r>
-              <a:rPr lang="en-US" sz="6200" dirty="0">
-                <a:solidFill>
-                  <a:schemeClr val="bg1"/>
-                </a:solidFill>
-              </a:rPr>
-              <a:t>Before clicking the continue button below, please make sure there are no distractions and that you can pay full attention to the task. </a:t>
-            </a:r>
-            <a:endParaRPr lang="en-US" sz="6200" dirty="0">
-              <a:solidFill>
-                <a:schemeClr val="bg1"/>
-              </a:solidFill>
-              <a:cs typeface="Calibri"/>
-            </a:endParaRPr>
-          </a:p>
-          <a:p>
-            <a:endParaRPr lang="en-US" sz="6200" dirty="0">
-              <a:solidFill>
-                <a:schemeClr val="bg1"/>
-              </a:solidFill>
-              <a:cs typeface="Calibri"/>
-            </a:endParaRPr>
-          </a:p>
-          <a:p>
-            <a:r>
-              <a:rPr lang="en-US" sz="6200" b="1" dirty="0">
-                <a:solidFill>
-                  <a:srgbClr val="92D050"/>
-                </a:solidFill>
-              </a:rPr>
-              <a:t>The aim of the task is to try your best and be honest about the confidence of your choices.</a:t>
-            </a:r>
-            <a:endParaRPr lang="en-US" sz="6200" dirty="0">
-              <a:solidFill>
-                <a:srgbClr val="92D050"/>
-              </a:solidFill>
-            </a:endParaRPr>
-          </a:p>
-        </p:txBody>
-      </p:sp>
-    </p:spTree>
-    <p:extLst>
-      <p:ext uri="{BB962C8B-B14F-4D97-AF65-F5344CB8AC3E}">
-        <p14:creationId xmlns:p14="http://schemas.microsoft.com/office/powerpoint/2010/main" val="3971898477"/>
-      </p:ext>
-    </p:extLst>
-  </p:cSld>
-  <p:clrMapOvr>
-    <a:masterClrMapping/>
-  </p:clrMapOvr>
-</p:sld>
-</file>
-
-<file path=ppt/slides/slide14.xml><?xml version="1.0" encoding="utf-8"?>
-<p:sld xmlns:a="http://schemas.openxmlformats.org/drawingml/2006/main" xmlns:r="http://schemas.openxmlformats.org/officeDocument/2006/relationships" xmlns:p="http://schemas.openxmlformats.org/presentationml/2006/main">
-  <p:cSld>
-    <p:bg>
-      <p:bgPr>
-        <a:solidFill>
-          <a:srgbClr val="808080"/>
-        </a:solidFill>
-        <a:effectLst/>
-      </p:bgPr>
-    </p:bg>
-    <p:spTree>
-      <p:nvGrpSpPr>
-        <p:cNvPr id="1" name=""/>
-        <p:cNvGrpSpPr/>
-        <p:nvPr/>
-      </p:nvGrpSpPr>
-      <p:grpSpPr>
-        <a:xfrm>
-          <a:off x="0" y="0"/>
-          <a:ext cx="0" cy="0"/>
-          <a:chOff x="0" y="0"/>
-          <a:chExt cx="0" cy="0"/>
-        </a:xfrm>
-      </p:grpSpPr>
-      <p:sp>
-        <p:nvSpPr>
-          <p:cNvPr id="2" name="Rectangle 1">
-            <a:extLst>
-              <a:ext uri="{FF2B5EF4-FFF2-40B4-BE49-F238E27FC236}">
-                <a16:creationId xmlns:a16="http://schemas.microsoft.com/office/drawing/2014/main" id="{A0FBFD53-51E8-79D1-5BFF-88CE7C895A62}"/>
-              </a:ext>
-            </a:extLst>
-          </p:cNvPr>
-          <p:cNvSpPr/>
-          <p:nvPr/>
-        </p:nvSpPr>
-        <p:spPr>
-          <a:xfrm>
-            <a:off x="2339937" y="1440262"/>
-            <a:ext cx="29880000" cy="16560000"/>
-          </a:xfrm>
-          <a:prstGeom prst="rect">
-            <a:avLst/>
-          </a:prstGeom>
-          <a:solidFill>
-            <a:srgbClr val="808080"/>
-          </a:solidFill>
-          <a:ln>
-            <a:noFill/>
-          </a:ln>
-        </p:spPr>
-        <p:style>
-          <a:lnRef idx="2">
-            <a:schemeClr val="accent1">
-              <a:shade val="15000"/>
-            </a:schemeClr>
-          </a:lnRef>
-          <a:fillRef idx="1">
-            <a:schemeClr val="accent1"/>
-          </a:fillRef>
-          <a:effectRef idx="0">
-            <a:schemeClr val="accent1"/>
-          </a:effectRef>
-          <a:fontRef idx="minor">
-            <a:schemeClr val="lt1"/>
-          </a:fontRef>
-        </p:style>
-        <p:txBody>
-          <a:bodyPr rtlCol="0" anchor="t" anchorCtr="0"/>
-          <a:lstStyle/>
-          <a:p>
-            <a:r>
-              <a:rPr lang="en-US" sz="6200" b="1" dirty="0">
-                <a:solidFill>
-                  <a:srgbClr val="FFFF00"/>
-                </a:solidFill>
-              </a:rPr>
-              <a:t>Comprehension check</a:t>
-            </a:r>
-          </a:p>
-          <a:p>
-            <a:pPr marL="857250" indent="-857250">
-              <a:buFont typeface="Arial" panose="020B0604020202020204" pitchFamily="34" charset="0"/>
-              <a:buChar char="•"/>
-            </a:pPr>
-            <a:endParaRPr lang="en-US" sz="6200" dirty="0">
-              <a:solidFill>
-                <a:schemeClr val="bg1"/>
-              </a:solidFill>
-              <a:cs typeface="Calibri"/>
-            </a:endParaRPr>
-          </a:p>
-          <a:p>
-            <a:pPr fontAlgn="base"/>
-            <a:r>
-              <a:rPr lang="en-US" sz="6200" dirty="0">
-                <a:solidFill>
-                  <a:schemeClr val="bg1"/>
-                </a:solidFill>
-                <a:cs typeface="Calibri"/>
-              </a:rPr>
-              <a:t>On each trial, two chemicals will be presented. As before, only one of these chemicals was presented in the learning part of the experiment (Task 1). However, this time the two chemicals will not be similar. Your task is to choose the one you have seen in the first part of the experiment (Task 1) by clicking on it. Once you make your choice, you will be presented with a scale to rate how certain you are that you made the correct choice (from 1 = completely uncertain to 10 = completely certain). ​</a:t>
-            </a:r>
-          </a:p>
-          <a:p>
-            <a:pPr fontAlgn="base"/>
-            <a:r>
-              <a:rPr lang="en-US" sz="6200" dirty="0">
-                <a:solidFill>
-                  <a:schemeClr val="bg1"/>
-                </a:solidFill>
-                <a:cs typeface="Calibri"/>
-              </a:rPr>
-              <a:t>​</a:t>
-            </a:r>
-          </a:p>
-          <a:p>
-            <a:pPr algn="l" rtl="0" fontAlgn="base"/>
-            <a:r>
-              <a:rPr lang="en-US" sz="6200" b="0" i="0" u="none" strike="noStrike" dirty="0">
-                <a:solidFill>
-                  <a:srgbClr val="FFFFFF"/>
-                </a:solidFill>
-                <a:effectLst/>
-                <a:latin typeface="Calibri" panose="020F0502020204030204" pitchFamily="34" charset="0"/>
-              </a:rPr>
-              <a:t>What are you instructed to do in this task?</a:t>
-            </a:r>
-            <a:r>
-              <a:rPr lang="en-US" sz="6200" b="0" i="0" dirty="0">
-                <a:solidFill>
-                  <a:srgbClr val="FFFFFF"/>
-                </a:solidFill>
-                <a:effectLst/>
-                <a:latin typeface="Calibri" panose="020F0502020204030204" pitchFamily="34" charset="0"/>
-              </a:rPr>
-              <a:t>​ (click on the correct answer)</a:t>
-            </a:r>
-            <a:endParaRPr lang="en-US" sz="6200" b="0" i="0" dirty="0">
-              <a:solidFill>
-                <a:srgbClr val="000000"/>
-              </a:solidFill>
-              <a:effectLst/>
-              <a:latin typeface="Segoe UI" panose="020B0502040204020203" pitchFamily="34" charset="0"/>
-            </a:endParaRPr>
-          </a:p>
-          <a:p>
-            <a:pPr algn="l" rtl="0" fontAlgn="base"/>
-            <a:r>
-              <a:rPr lang="en-US" sz="6200" b="0" i="1" dirty="0">
-                <a:solidFill>
-                  <a:srgbClr val="FFFFFF"/>
-                </a:solidFill>
-                <a:effectLst/>
-                <a:latin typeface="Calibri" panose="020F0502020204030204" pitchFamily="34" charset="0"/>
-              </a:rPr>
-              <a:t>​</a:t>
-            </a:r>
-            <a:r>
-              <a:rPr lang="en-US" sz="6200" b="0" i="1" u="none" strike="noStrike" dirty="0">
-                <a:solidFill>
-                  <a:srgbClr val="FFFFFF"/>
-                </a:solidFill>
-                <a:effectLst/>
-                <a:latin typeface="Calibri" panose="020F0502020204030204" pitchFamily="34" charset="0"/>
-              </a:rPr>
-              <a:t>Please, re-read the instructions above if you are not sure. You will have two opportunities to get this question correct</a:t>
-            </a:r>
-            <a:r>
-              <a:rPr lang="en-US" sz="6200" b="0" i="1" dirty="0">
-                <a:solidFill>
-                  <a:srgbClr val="FFFFFF"/>
-                </a:solidFill>
-                <a:effectLst/>
-                <a:latin typeface="Calibri" panose="020F0502020204030204" pitchFamily="34" charset="0"/>
-              </a:rPr>
-              <a:t>​</a:t>
-            </a:r>
-            <a:endParaRPr lang="en-US" sz="6200" b="0" i="1" dirty="0">
-              <a:solidFill>
-                <a:srgbClr val="000000"/>
-              </a:solidFill>
-              <a:effectLst/>
-              <a:latin typeface="Segoe UI" panose="020B0502040204020203" pitchFamily="34" charset="0"/>
-            </a:endParaRPr>
-          </a:p>
-          <a:p>
-            <a:pPr marL="857250" indent="-857250">
-              <a:buFont typeface="Arial" panose="020B0604020202020204" pitchFamily="34" charset="0"/>
-              <a:buChar char="•"/>
-            </a:pPr>
-            <a:endParaRPr lang="en-US" sz="6200" dirty="0">
-              <a:solidFill>
-                <a:schemeClr val="bg1"/>
-              </a:solidFill>
-              <a:cs typeface="Calibri"/>
-            </a:endParaRPr>
-          </a:p>
-          <a:p>
-            <a:pPr marL="857250" indent="-857250">
-              <a:buFont typeface="Arial" panose="020B0604020202020204" pitchFamily="34" charset="0"/>
-              <a:buChar char="•"/>
-            </a:pPr>
-            <a:r>
-              <a:rPr lang="en-US" sz="6200" dirty="0">
-                <a:solidFill>
-                  <a:schemeClr val="bg1"/>
-                </a:solidFill>
-                <a:cs typeface="Calibri"/>
-              </a:rPr>
-              <a:t>Click on the mutant that would result of each chemicals combination</a:t>
-            </a:r>
-          </a:p>
-          <a:p>
-            <a:pPr marL="857250" indent="-857250">
-              <a:buFont typeface="Arial" panose="020B0604020202020204" pitchFamily="34" charset="0"/>
-              <a:buChar char="•"/>
-            </a:pPr>
-            <a:r>
-              <a:rPr lang="en-US" sz="6200" dirty="0">
-                <a:solidFill>
-                  <a:schemeClr val="bg1"/>
-                </a:solidFill>
-                <a:cs typeface="Calibri"/>
-              </a:rPr>
-              <a:t>Select the chemical you have seen in Task 1</a:t>
-            </a:r>
-          </a:p>
-          <a:p>
-            <a:pPr marL="857250" indent="-857250">
-              <a:buFont typeface="Arial" panose="020B0604020202020204" pitchFamily="34" charset="0"/>
-              <a:buChar char="•"/>
-            </a:pPr>
-            <a:r>
-              <a:rPr lang="en-US" sz="6200" dirty="0">
-                <a:solidFill>
-                  <a:schemeClr val="bg1"/>
-                </a:solidFill>
-                <a:cs typeface="Calibri"/>
-              </a:rPr>
-              <a:t>Rate how beautiful the chemicals presented are</a:t>
-            </a:r>
-          </a:p>
-          <a:p>
-            <a:pPr marL="857250" indent="-857250">
-              <a:buFont typeface="Arial" panose="020B0604020202020204" pitchFamily="34" charset="0"/>
-              <a:buChar char="•"/>
-            </a:pPr>
-            <a:endParaRPr lang="en-US" sz="6200" dirty="0">
-              <a:solidFill>
-                <a:schemeClr val="bg1"/>
-              </a:solidFill>
-              <a:cs typeface="Calibri"/>
-            </a:endParaRPr>
-          </a:p>
-          <a:p>
-            <a:endParaRPr lang="en-US" sz="6200" dirty="0">
-              <a:solidFill>
-                <a:schemeClr val="bg1"/>
-              </a:solidFill>
-              <a:cs typeface="Calibri"/>
-            </a:endParaRPr>
-          </a:p>
-          <a:p>
-            <a:pPr marL="857250" indent="-857250">
-              <a:buFont typeface="Arial" panose="020B0604020202020204" pitchFamily="34" charset="0"/>
-              <a:buChar char="•"/>
-            </a:pPr>
-            <a:endParaRPr lang="en-US" sz="6200" b="1" dirty="0">
-              <a:solidFill>
-                <a:schemeClr val="bg1"/>
-              </a:solidFill>
-              <a:cs typeface="Calibri"/>
-            </a:endParaRPr>
-          </a:p>
-          <a:p>
-            <a:endParaRPr lang="en-US" sz="6200" b="1" dirty="0">
-              <a:solidFill>
-                <a:schemeClr val="bg1"/>
-              </a:solidFill>
-              <a:cs typeface="Calibri"/>
-            </a:endParaRPr>
-          </a:p>
-          <a:p>
-            <a:pPr marL="857250" indent="-857250">
-              <a:buFont typeface="Arial" panose="020B0604020202020204" pitchFamily="34" charset="0"/>
-              <a:buChar char="•"/>
-            </a:pPr>
-            <a:endParaRPr lang="en-US" sz="6200" b="1" dirty="0">
-              <a:solidFill>
-                <a:schemeClr val="bg1"/>
-              </a:solidFill>
-              <a:cs typeface="Calibri"/>
-            </a:endParaRPr>
-          </a:p>
-        </p:txBody>
-      </p:sp>
-    </p:spTree>
-    <p:extLst>
-      <p:ext uri="{BB962C8B-B14F-4D97-AF65-F5344CB8AC3E}">
-        <p14:creationId xmlns:p14="http://schemas.microsoft.com/office/powerpoint/2010/main" val="2183151105"/>
-      </p:ext>
-    </p:extLst>
-  </p:cSld>
-  <p:clrMapOvr>
-    <a:masterClrMapping/>
-  </p:clrMapOvr>
-</p:sld>
-</file>
-
-<file path=ppt/slides/slide15.xml><?xml version="1.0" encoding="utf-8"?>
-<p:sld xmlns:a="http://schemas.openxmlformats.org/drawingml/2006/main" xmlns:r="http://schemas.openxmlformats.org/officeDocument/2006/relationships" xmlns:p="http://schemas.openxmlformats.org/presentationml/2006/main">
-  <p:cSld>
-    <p:bg>
-      <p:bgPr>
-        <a:solidFill>
-          <a:srgbClr val="808080"/>
-        </a:solidFill>
-        <a:effectLst/>
-      </p:bgPr>
-    </p:bg>
-    <p:spTree>
-      <p:nvGrpSpPr>
-        <p:cNvPr id="1" name=""/>
-        <p:cNvGrpSpPr/>
-        <p:nvPr/>
-      </p:nvGrpSpPr>
-      <p:grpSpPr>
-        <a:xfrm>
-          <a:off x="0" y="0"/>
-          <a:ext cx="0" cy="0"/>
-          <a:chOff x="0" y="0"/>
-          <a:chExt cx="0" cy="0"/>
-        </a:xfrm>
-      </p:grpSpPr>
-      <p:sp>
-        <p:nvSpPr>
-          <p:cNvPr id="2" name="Rectangle 1">
-            <a:extLst>
-              <a:ext uri="{FF2B5EF4-FFF2-40B4-BE49-F238E27FC236}">
-                <a16:creationId xmlns:a16="http://schemas.microsoft.com/office/drawing/2014/main" id="{1D19C4EF-6384-C0FA-0F14-5F33F6CAE244}"/>
+                <a16:creationId xmlns:a16="http://schemas.microsoft.com/office/drawing/2014/main" id="{C7166764-0A0F-3E64-F790-2D9142865C1A}"/>
               </a:ext>
             </a:extLst>
           </p:cNvPr>
@@ -7320,153 +6678,6 @@
                   <a:schemeClr val="bg1"/>
                 </a:solidFill>
               </a:rPr>
-              <a:t>Thank you for your participation in this study. </a:t>
-            </a:r>
-          </a:p>
-          <a:p>
-            <a:endParaRPr lang="en-GB" sz="6200" dirty="0">
-              <a:solidFill>
-                <a:schemeClr val="bg1"/>
-              </a:solidFill>
-            </a:endParaRPr>
-          </a:p>
-          <a:p>
-            <a:r>
-              <a:rPr lang="en-GB" sz="6200" dirty="0">
-                <a:solidFill>
-                  <a:schemeClr val="bg1"/>
-                </a:solidFill>
-              </a:rPr>
-              <a:t>This study is part of a series of experiments that are designed to investigate attentional processes underlying human learning. Specifically, we aim to explore how the stimuli are processed under different levels of attention.</a:t>
-            </a:r>
-          </a:p>
-          <a:p>
-            <a:endParaRPr lang="en-GB" sz="6200" dirty="0">
-              <a:solidFill>
-                <a:schemeClr val="bg1"/>
-              </a:solidFill>
-            </a:endParaRPr>
-          </a:p>
-          <a:p>
-            <a:r>
-              <a:rPr lang="en-GB" sz="6200" dirty="0">
-                <a:solidFill>
-                  <a:schemeClr val="bg1"/>
-                </a:solidFill>
-              </a:rPr>
-              <a:t>Once a cue is associated with a meaningful outcome (i.e., a response and/or a reward) an attentional bias towards this cue is established. The learnt predictive value of the cue leads to more overt attention being allocated towards it, which increases how much we learn about that cue in the future. </a:t>
-            </a:r>
-          </a:p>
-          <a:p>
-            <a:endParaRPr lang="en-GB" sz="6200" dirty="0">
-              <a:solidFill>
-                <a:schemeClr val="bg1"/>
-              </a:solidFill>
-            </a:endParaRPr>
-          </a:p>
-          <a:p>
-            <a:r>
-              <a:rPr lang="en-GB" sz="6200" dirty="0">
-                <a:solidFill>
-                  <a:schemeClr val="bg1"/>
-                </a:solidFill>
-              </a:rPr>
-              <a:t>This experiment examines whether higher attention also leads to better recollection of the stimuli.</a:t>
-            </a:r>
-          </a:p>
-        </p:txBody>
-      </p:sp>
-    </p:spTree>
-    <p:extLst>
-      <p:ext uri="{BB962C8B-B14F-4D97-AF65-F5344CB8AC3E}">
-        <p14:creationId xmlns:p14="http://schemas.microsoft.com/office/powerpoint/2010/main" val="1439089530"/>
-      </p:ext>
-    </p:extLst>
-  </p:cSld>
-  <p:clrMapOvr>
-    <a:masterClrMapping/>
-  </p:clrMapOvr>
-</p:sld>
-</file>
-
-<file path=ppt/slides/slide16.xml><?xml version="1.0" encoding="utf-8"?>
-<p:sld xmlns:a="http://schemas.openxmlformats.org/drawingml/2006/main" xmlns:r="http://schemas.openxmlformats.org/officeDocument/2006/relationships" xmlns:p="http://schemas.openxmlformats.org/presentationml/2006/main">
-  <p:cSld>
-    <p:bg>
-      <p:bgPr>
-        <a:solidFill>
-          <a:srgbClr val="808080"/>
-        </a:solidFill>
-        <a:effectLst/>
-      </p:bgPr>
-    </p:bg>
-    <p:spTree>
-      <p:nvGrpSpPr>
-        <p:cNvPr id="1" name=""/>
-        <p:cNvGrpSpPr/>
-        <p:nvPr/>
-      </p:nvGrpSpPr>
-      <p:grpSpPr>
-        <a:xfrm>
-          <a:off x="0" y="0"/>
-          <a:ext cx="0" cy="0"/>
-          <a:chOff x="0" y="0"/>
-          <a:chExt cx="0" cy="0"/>
-        </a:xfrm>
-      </p:grpSpPr>
-      <p:sp>
-        <p:nvSpPr>
-          <p:cNvPr id="2" name="Rectangle 1">
-            <a:extLst>
-              <a:ext uri="{FF2B5EF4-FFF2-40B4-BE49-F238E27FC236}">
-                <a16:creationId xmlns:a16="http://schemas.microsoft.com/office/drawing/2014/main" id="{C7166764-0A0F-3E64-F790-2D9142865C1A}"/>
-              </a:ext>
-            </a:extLst>
-          </p:cNvPr>
-          <p:cNvSpPr/>
-          <p:nvPr/>
-        </p:nvSpPr>
-        <p:spPr>
-          <a:xfrm>
-            <a:off x="2339937" y="1440262"/>
-            <a:ext cx="29880000" cy="16560000"/>
-          </a:xfrm>
-          <a:prstGeom prst="rect">
-            <a:avLst/>
-          </a:prstGeom>
-          <a:solidFill>
-            <a:srgbClr val="7030A0"/>
-          </a:solidFill>
-          <a:ln>
-            <a:noFill/>
-          </a:ln>
-        </p:spPr>
-        <p:style>
-          <a:lnRef idx="2">
-            <a:schemeClr val="accent1">
-              <a:shade val="15000"/>
-            </a:schemeClr>
-          </a:lnRef>
-          <a:fillRef idx="1">
-            <a:schemeClr val="accent1"/>
-          </a:fillRef>
-          <a:effectRef idx="0">
-            <a:schemeClr val="accent1"/>
-          </a:effectRef>
-          <a:fontRef idx="minor">
-            <a:schemeClr val="lt1"/>
-          </a:fontRef>
-        </p:style>
-        <p:txBody>
-          <a:bodyPr rtlCol="0" anchor="t" anchorCtr="0"/>
-          <a:lstStyle/>
-          <a:p>
-            <a:r>
-              <a:rPr lang="en-GB" sz="6200" dirty="0">
-                <a:solidFill>
-                  <a:schemeClr val="bg1"/>
-                </a:solidFill>
-              </a:rPr>
               <a:t>Findings from this experiment will contribute to our understanding of processes underlying the interaction between attention and learning, which can also enhance our understanding of maladaptive mechanisms. For example, if attention is found to be automatically directed to previously predictive cues then this would indicate that conscious efforts to change behaviour are ineffective on their own. As such, cognitive retraining may be necessary to reverse maladaptive attentional biases that automatically associate harmful stimuli (e.g. drugs) with reward.</a:t>
             </a:r>
           </a:p>
@@ -7518,7 +6729,7 @@
 </p:sld>
 </file>
 
-<file path=ppt/slides/slide17.xml><?xml version="1.0" encoding="utf-8"?>
+<file path=ppt/slides/slide14.xml><?xml version="1.0" encoding="utf-8"?>
 <p:sld xmlns:a="http://schemas.openxmlformats.org/drawingml/2006/main" xmlns:r="http://schemas.openxmlformats.org/officeDocument/2006/relationships" xmlns:p="http://schemas.openxmlformats.org/presentationml/2006/main">
   <p:cSld>
     <p:bg>
@@ -9249,23 +8460,7 @@
                   <a:schemeClr val="bg1"/>
                 </a:solidFill>
               </a:rPr>
-              <a:t>The following task will require you to take a simple memory test. Two chemicals will appear in the top half of the screen. One of this chemicals has been presented in the task you have just finished, whereas the other is a similar one, but with different </a:t>
-            </a:r>
-            <a:r>
-              <a:rPr lang="en-GB" sz="6200" dirty="0">
-                <a:solidFill>
-                  <a:schemeClr val="bg1"/>
-                </a:solidFill>
-              </a:rPr>
-              <a:t>colours</a:t>
-            </a:r>
-            <a:r>
-              <a:rPr lang="en-US" sz="6200" dirty="0">
-                <a:solidFill>
-                  <a:schemeClr val="bg1"/>
-                </a:solidFill>
-              </a:rPr>
-              <a:t>. </a:t>
+              <a:t>The following task will require you to take a simple memory test. Two chemicals will appear in the top half of the screen. One of this chemicals has been presented in the task you have just finished. The other chemical has never appeared in the previous task, although it will be similar. </a:t>
             </a:r>
           </a:p>
           <a:p>

</xml_diff>